<commit_message>
added club stuff to report
</commit_message>
<xml_diff>
--- a/Documentation/Weekly Report/week5/CMSC-4920-Group2-Week5.pptx
+++ b/Documentation/Weekly Report/week5/CMSC-4920-Group2-Week5.pptx
@@ -6614,7 +6614,7 @@
           <a:p>
             <a:fld id="{C882E6FB-EB88-4936-BED9-9E37159958CA}" type="datetimeFigureOut">
               <a:rPr lang="en-US" smtClean="0"/>
-              <a:t>2/14/2026</a:t>
+              <a:t>2/15/2026</a:t>
             </a:fld>
             <a:endParaRPr lang="en-US"/>
           </a:p>
@@ -6812,7 +6812,7 @@
           <a:p>
             <a:fld id="{C882E6FB-EB88-4936-BED9-9E37159958CA}" type="datetimeFigureOut">
               <a:rPr lang="en-US" smtClean="0"/>
-              <a:t>2/14/2026</a:t>
+              <a:t>2/15/2026</a:t>
             </a:fld>
             <a:endParaRPr lang="en-US"/>
           </a:p>
@@ -7020,7 +7020,7 @@
           <a:p>
             <a:fld id="{C882E6FB-EB88-4936-BED9-9E37159958CA}" type="datetimeFigureOut">
               <a:rPr lang="en-US" smtClean="0"/>
-              <a:t>2/14/2026</a:t>
+              <a:t>2/15/2026</a:t>
             </a:fld>
             <a:endParaRPr lang="en-US"/>
           </a:p>
@@ -7218,7 +7218,7 @@
           <a:p>
             <a:fld id="{C882E6FB-EB88-4936-BED9-9E37159958CA}" type="datetimeFigureOut">
               <a:rPr lang="en-US" smtClean="0"/>
-              <a:t>2/14/2026</a:t>
+              <a:t>2/15/2026</a:t>
             </a:fld>
             <a:endParaRPr lang="en-US"/>
           </a:p>
@@ -7493,7 +7493,7 @@
           <a:p>
             <a:fld id="{C882E6FB-EB88-4936-BED9-9E37159958CA}" type="datetimeFigureOut">
               <a:rPr lang="en-US" smtClean="0"/>
-              <a:t>2/14/2026</a:t>
+              <a:t>2/15/2026</a:t>
             </a:fld>
             <a:endParaRPr lang="en-US"/>
           </a:p>
@@ -7758,7 +7758,7 @@
           <a:p>
             <a:fld id="{C882E6FB-EB88-4936-BED9-9E37159958CA}" type="datetimeFigureOut">
               <a:rPr lang="en-US" smtClean="0"/>
-              <a:t>2/14/2026</a:t>
+              <a:t>2/15/2026</a:t>
             </a:fld>
             <a:endParaRPr lang="en-US"/>
           </a:p>
@@ -8170,7 +8170,7 @@
           <a:p>
             <a:fld id="{C882E6FB-EB88-4936-BED9-9E37159958CA}" type="datetimeFigureOut">
               <a:rPr lang="en-US" smtClean="0"/>
-              <a:t>2/14/2026</a:t>
+              <a:t>2/15/2026</a:t>
             </a:fld>
             <a:endParaRPr lang="en-US"/>
           </a:p>
@@ -8311,7 +8311,7 @@
           <a:p>
             <a:fld id="{C882E6FB-EB88-4936-BED9-9E37159958CA}" type="datetimeFigureOut">
               <a:rPr lang="en-US" smtClean="0"/>
-              <a:t>2/14/2026</a:t>
+              <a:t>2/15/2026</a:t>
             </a:fld>
             <a:endParaRPr lang="en-US"/>
           </a:p>
@@ -8424,7 +8424,7 @@
           <a:p>
             <a:fld id="{C882E6FB-EB88-4936-BED9-9E37159958CA}" type="datetimeFigureOut">
               <a:rPr lang="en-US" smtClean="0"/>
-              <a:t>2/14/2026</a:t>
+              <a:t>2/15/2026</a:t>
             </a:fld>
             <a:endParaRPr lang="en-US"/>
           </a:p>
@@ -8735,7 +8735,7 @@
           <a:p>
             <a:fld id="{C882E6FB-EB88-4936-BED9-9E37159958CA}" type="datetimeFigureOut">
               <a:rPr lang="en-US" smtClean="0"/>
-              <a:t>2/14/2026</a:t>
+              <a:t>2/15/2026</a:t>
             </a:fld>
             <a:endParaRPr lang="en-US"/>
           </a:p>
@@ -9023,7 +9023,7 @@
           <a:p>
             <a:fld id="{C882E6FB-EB88-4936-BED9-9E37159958CA}" type="datetimeFigureOut">
               <a:rPr lang="en-US" smtClean="0"/>
-              <a:t>2/14/2026</a:t>
+              <a:t>2/15/2026</a:t>
             </a:fld>
             <a:endParaRPr lang="en-US"/>
           </a:p>
@@ -9264,7 +9264,7 @@
           <a:p>
             <a:fld id="{C882E6FB-EB88-4936-BED9-9E37159958CA}" type="datetimeFigureOut">
               <a:rPr lang="en-US" smtClean="0"/>
-              <a:t>2/14/2026</a:t>
+              <a:t>2/15/2026</a:t>
             </a:fld>
             <a:endParaRPr lang="en-US"/>
           </a:p>
@@ -11396,15 +11396,7 @@
                   <a:schemeClr val="tx1"/>
                 </a:solidFill>
               </a:rPr>
-              <a:t>Removing Club must </a:t>
-            </a:r>
-            <a:r>
-              <a:rPr lang="en-US" sz="1900">
-                <a:solidFill>
-                  <a:schemeClr val="tx1"/>
-                </a:solidFill>
-              </a:rPr>
-              <a:t>remove User ID’s</a:t>
+              <a:t>Dynamic route handling</a:t>
             </a:r>
             <a:endParaRPr lang="en-US" sz="2000" dirty="0">
               <a:solidFill>
@@ -11681,7 +11673,7 @@
                   <a:schemeClr val="tx1"/>
                 </a:solidFill>
               </a:rPr>
-              <a:t>Creation of database logic to remove club members</a:t>
+              <a:t>Had to create a new route handler that can take parameters</a:t>
             </a:r>
             <a:endParaRPr lang="en-US" sz="2000" dirty="0">
               <a:solidFill>

</xml_diff>